<commit_message>
Removed not needed Object.assign(), which solves some cache issues and duplicate entries in local storage.
</commit_message>
<xml_diff>
--- a/src/statics/logo_three_post_its/logo_three_post_its.pptx
+++ b/src/statics/logo_three_post_its/logo_three_post_its.pptx
@@ -5,10 +5,11 @@
     <p:sldMasterId id="2147483648" r:id="rId1"/>
   </p:sldMasterIdLst>
   <p:notesMasterIdLst>
-    <p:notesMasterId r:id="rId3"/>
+    <p:notesMasterId r:id="rId4"/>
   </p:notesMasterIdLst>
   <p:sldIdLst>
     <p:sldId id="256" r:id="rId2"/>
+    <p:sldId id="257" r:id="rId3"/>
   </p:sldIdLst>
   <p:sldSz cx="12192000" cy="6858000"/>
   <p:notesSz cx="6858000" cy="9144000"/>
@@ -197,7 +198,7 @@
           <a:p>
             <a:fld id="{AFE0028A-F952-0746-A39E-5155B39678B7}" type="datetimeFigureOut">
               <a:rPr lang="de-DE" smtClean="0"/>
-              <a:t>25.04.19</a:t>
+              <a:t>26.04.19</a:t>
             </a:fld>
             <a:endParaRPr lang="de-DE"/>
           </a:p>
@@ -676,6 +677,217 @@
 </p:notes>
 </file>
 
+<file path=ppt/notesSlides/notesSlide2.xml><?xml version="1.0" encoding="utf-8"?>
+<p:notes xmlns:a="http://schemas.openxmlformats.org/drawingml/2006/main" xmlns:r="http://schemas.openxmlformats.org/officeDocument/2006/relationships" xmlns:p="http://schemas.openxmlformats.org/presentationml/2006/main">
+  <p:cSld>
+    <p:spTree>
+      <p:nvGrpSpPr>
+        <p:cNvPr id="1" name=""/>
+        <p:cNvGrpSpPr/>
+        <p:nvPr/>
+      </p:nvGrpSpPr>
+      <p:grpSpPr>
+        <a:xfrm>
+          <a:off x="0" y="0"/>
+          <a:ext cx="0" cy="0"/>
+          <a:chOff x="0" y="0"/>
+          <a:chExt cx="0" cy="0"/>
+        </a:xfrm>
+      </p:grpSpPr>
+      <p:sp>
+        <p:nvSpPr>
+          <p:cNvPr id="2" name="Slide Image Placeholder 1"/>
+          <p:cNvSpPr>
+            <a:spLocks noGrp="1" noRot="1" noChangeAspect="1"/>
+          </p:cNvSpPr>
+          <p:nvPr>
+            <p:ph type="sldImg"/>
+          </p:nvPr>
+        </p:nvSpPr>
+        <p:spPr/>
+      </p:sp>
+      <p:sp>
+        <p:nvSpPr>
+          <p:cNvPr id="3" name="Notes Placeholder 2"/>
+          <p:cNvSpPr>
+            <a:spLocks noGrp="1"/>
+          </p:cNvSpPr>
+          <p:nvPr>
+            <p:ph type="body" idx="1"/>
+          </p:nvPr>
+        </p:nvSpPr>
+        <p:spPr/>
+        <p:txBody>
+          <a:bodyPr/>
+          <a:lstStyle/>
+          <a:p>
+            <a:r>
+              <a:rPr lang="de-DE" dirty="0"/>
+              <a:t>Colors:</a:t>
+            </a:r>
+          </a:p>
+          <a:p>
+            <a:r>
+              <a:rPr lang="de-DE" dirty="0"/>
+              <a:t>Light Yellow: </a:t>
+            </a:r>
+          </a:p>
+          <a:p>
+            <a:r>
+              <a:rPr lang="de-DE" dirty="0"/>
+              <a:t>RGB: 254, 217, 102</a:t>
+            </a:r>
+          </a:p>
+          <a:p>
+            <a:pPr marL="0" marR="0" lvl="0" indent="0" algn="l" defTabSz="914400" rtl="0" eaLnBrk="1" fontAlgn="auto" latinLnBrk="0" hangingPunct="1">
+              <a:lnSpc>
+                <a:spcPct val="100000"/>
+              </a:lnSpc>
+              <a:spcBef>
+                <a:spcPts val="0"/>
+              </a:spcBef>
+              <a:spcAft>
+                <a:spcPts val="0"/>
+              </a:spcAft>
+              <a:buClrTx/>
+              <a:buSzTx/>
+              <a:buFontTx/>
+              <a:buNone/>
+              <a:tabLst/>
+              <a:defRPr/>
+            </a:pPr>
+            <a:r>
+              <a:rPr lang="de-DE" sz="1200" b="1" i="0" kern="1200" dirty="0">
+                <a:solidFill>
+                  <a:schemeClr val="tx1"/>
+                </a:solidFill>
+                <a:effectLst/>
+                <a:latin typeface="+mn-lt"/>
+                <a:ea typeface="+mn-ea"/>
+                <a:cs typeface="+mn-cs"/>
+              </a:rPr>
+              <a:t>#FED966</a:t>
+            </a:r>
+            <a:endParaRPr lang="de-DE" dirty="0"/>
+          </a:p>
+          <a:p>
+            <a:endParaRPr lang="de-DE" dirty="0"/>
+          </a:p>
+          <a:p>
+            <a:r>
+              <a:rPr lang="de-DE" dirty="0" err="1"/>
+              <a:t>Darker</a:t>
+            </a:r>
+            <a:r>
+              <a:rPr lang="de-DE" dirty="0"/>
+              <a:t> Yellow:</a:t>
+            </a:r>
+          </a:p>
+          <a:p>
+            <a:r>
+              <a:rPr lang="de-DE" dirty="0"/>
+              <a:t>RGB:  254, 192, 0</a:t>
+            </a:r>
+          </a:p>
+          <a:p>
+            <a:r>
+              <a:rPr lang="de-DE" sz="1200" b="1" i="0" kern="1200" dirty="0">
+                <a:solidFill>
+                  <a:schemeClr val="tx1"/>
+                </a:solidFill>
+                <a:effectLst/>
+                <a:latin typeface="+mn-lt"/>
+                <a:ea typeface="+mn-ea"/>
+                <a:cs typeface="+mn-cs"/>
+              </a:rPr>
+              <a:t>#FEC000</a:t>
+            </a:r>
+            <a:endParaRPr lang="de-DE" dirty="0"/>
+          </a:p>
+          <a:p>
+            <a:endParaRPr lang="de-DE" dirty="0"/>
+          </a:p>
+          <a:p>
+            <a:r>
+              <a:rPr lang="de-DE" dirty="0"/>
+              <a:t>Orange:</a:t>
+            </a:r>
+          </a:p>
+          <a:p>
+            <a:r>
+              <a:rPr lang="de-DE" dirty="0"/>
+              <a:t>RGB: 237, 125, 49</a:t>
+            </a:r>
+          </a:p>
+          <a:p>
+            <a:pPr marL="0" marR="0" lvl="0" indent="0" algn="l" defTabSz="914400" rtl="0" eaLnBrk="1" fontAlgn="auto" latinLnBrk="0" hangingPunct="1">
+              <a:lnSpc>
+                <a:spcPct val="100000"/>
+              </a:lnSpc>
+              <a:spcBef>
+                <a:spcPts val="0"/>
+              </a:spcBef>
+              <a:spcAft>
+                <a:spcPts val="0"/>
+              </a:spcAft>
+              <a:buClrTx/>
+              <a:buSzTx/>
+              <a:buFontTx/>
+              <a:buNone/>
+              <a:tabLst/>
+              <a:defRPr/>
+            </a:pPr>
+            <a:r>
+              <a:rPr lang="de-DE" sz="1200" b="1" i="0" kern="1200">
+                <a:solidFill>
+                  <a:schemeClr val="tx1"/>
+                </a:solidFill>
+                <a:effectLst/>
+                <a:latin typeface="+mn-lt"/>
+                <a:ea typeface="+mn-ea"/>
+                <a:cs typeface="+mn-cs"/>
+              </a:rPr>
+              <a:t>#ED7D31</a:t>
+            </a:r>
+          </a:p>
+        </p:txBody>
+      </p:sp>
+      <p:sp>
+        <p:nvSpPr>
+          <p:cNvPr id="4" name="Slide Number Placeholder 3"/>
+          <p:cNvSpPr>
+            <a:spLocks noGrp="1"/>
+          </p:cNvSpPr>
+          <p:nvPr>
+            <p:ph type="sldNum" sz="quarter" idx="5"/>
+          </p:nvPr>
+        </p:nvSpPr>
+        <p:spPr/>
+        <p:txBody>
+          <a:bodyPr/>
+          <a:lstStyle/>
+          <a:p>
+            <a:fld id="{24786A14-5CC9-1444-825E-73F7627F472C}" type="slidenum">
+              <a:rPr lang="de-DE" smtClean="0"/>
+              <a:t>2</a:t>
+            </a:fld>
+            <a:endParaRPr lang="de-DE"/>
+          </a:p>
+        </p:txBody>
+      </p:sp>
+    </p:spTree>
+    <p:extLst>
+      <p:ext uri="{BB962C8B-B14F-4D97-AF65-F5344CB8AC3E}">
+        <p14:creationId xmlns:p14="http://schemas.microsoft.com/office/powerpoint/2010/main" val="3347806509"/>
+      </p:ext>
+    </p:extLst>
+  </p:cSld>
+  <p:clrMapOvr>
+    <a:masterClrMapping/>
+  </p:clrMapOvr>
+</p:notes>
+</file>
+
 <file path=ppt/slideLayouts/slideLayout1.xml><?xml version="1.0" encoding="utf-8"?>
 <p:sldLayout xmlns:a="http://schemas.openxmlformats.org/drawingml/2006/main" xmlns:r="http://schemas.openxmlformats.org/officeDocument/2006/relationships" xmlns:p="http://schemas.openxmlformats.org/presentationml/2006/main" type="title" preserve="1">
   <p:cSld name="Title Slide">
@@ -825,7 +1037,7 @@
           <a:p>
             <a:fld id="{51832511-F33A-8E4F-A425-D29CC13046B8}" type="datetimeFigureOut">
               <a:rPr lang="de-DE" smtClean="0"/>
-              <a:t>25.04.19</a:t>
+              <a:t>26.04.19</a:t>
             </a:fld>
             <a:endParaRPr lang="de-DE"/>
           </a:p>
@@ -1025,7 +1237,7 @@
           <a:p>
             <a:fld id="{51832511-F33A-8E4F-A425-D29CC13046B8}" type="datetimeFigureOut">
               <a:rPr lang="de-DE" smtClean="0"/>
-              <a:t>25.04.19</a:t>
+              <a:t>26.04.19</a:t>
             </a:fld>
             <a:endParaRPr lang="de-DE"/>
           </a:p>
@@ -1235,7 +1447,7 @@
           <a:p>
             <a:fld id="{51832511-F33A-8E4F-A425-D29CC13046B8}" type="datetimeFigureOut">
               <a:rPr lang="de-DE" smtClean="0"/>
-              <a:t>25.04.19</a:t>
+              <a:t>26.04.19</a:t>
             </a:fld>
             <a:endParaRPr lang="de-DE"/>
           </a:p>
@@ -1435,7 +1647,7 @@
           <a:p>
             <a:fld id="{51832511-F33A-8E4F-A425-D29CC13046B8}" type="datetimeFigureOut">
               <a:rPr lang="de-DE" smtClean="0"/>
-              <a:t>25.04.19</a:t>
+              <a:t>26.04.19</a:t>
             </a:fld>
             <a:endParaRPr lang="de-DE"/>
           </a:p>
@@ -1711,7 +1923,7 @@
           <a:p>
             <a:fld id="{51832511-F33A-8E4F-A425-D29CC13046B8}" type="datetimeFigureOut">
               <a:rPr lang="de-DE" smtClean="0"/>
-              <a:t>25.04.19</a:t>
+              <a:t>26.04.19</a:t>
             </a:fld>
             <a:endParaRPr lang="de-DE"/>
           </a:p>
@@ -1979,7 +2191,7 @@
           <a:p>
             <a:fld id="{51832511-F33A-8E4F-A425-D29CC13046B8}" type="datetimeFigureOut">
               <a:rPr lang="de-DE" smtClean="0"/>
-              <a:t>25.04.19</a:t>
+              <a:t>26.04.19</a:t>
             </a:fld>
             <a:endParaRPr lang="de-DE"/>
           </a:p>
@@ -2394,7 +2606,7 @@
           <a:p>
             <a:fld id="{51832511-F33A-8E4F-A425-D29CC13046B8}" type="datetimeFigureOut">
               <a:rPr lang="de-DE" smtClean="0"/>
-              <a:t>25.04.19</a:t>
+              <a:t>26.04.19</a:t>
             </a:fld>
             <a:endParaRPr lang="de-DE"/>
           </a:p>
@@ -2536,7 +2748,7 @@
           <a:p>
             <a:fld id="{51832511-F33A-8E4F-A425-D29CC13046B8}" type="datetimeFigureOut">
               <a:rPr lang="de-DE" smtClean="0"/>
-              <a:t>25.04.19</a:t>
+              <a:t>26.04.19</a:t>
             </a:fld>
             <a:endParaRPr lang="de-DE"/>
           </a:p>
@@ -2649,7 +2861,7 @@
           <a:p>
             <a:fld id="{51832511-F33A-8E4F-A425-D29CC13046B8}" type="datetimeFigureOut">
               <a:rPr lang="de-DE" smtClean="0"/>
-              <a:t>25.04.19</a:t>
+              <a:t>26.04.19</a:t>
             </a:fld>
             <a:endParaRPr lang="de-DE"/>
           </a:p>
@@ -2962,7 +3174,7 @@
           <a:p>
             <a:fld id="{51832511-F33A-8E4F-A425-D29CC13046B8}" type="datetimeFigureOut">
               <a:rPr lang="de-DE" smtClean="0"/>
-              <a:t>25.04.19</a:t>
+              <a:t>26.04.19</a:t>
             </a:fld>
             <a:endParaRPr lang="de-DE"/>
           </a:p>
@@ -3251,7 +3463,7 @@
           <a:p>
             <a:fld id="{51832511-F33A-8E4F-A425-D29CC13046B8}" type="datetimeFigureOut">
               <a:rPr lang="de-DE" smtClean="0"/>
-              <a:t>25.04.19</a:t>
+              <a:t>26.04.19</a:t>
             </a:fld>
             <a:endParaRPr lang="de-DE"/>
           </a:p>
@@ -3494,7 +3706,7 @@
           <a:p>
             <a:fld id="{51832511-F33A-8E4F-A425-D29CC13046B8}" type="datetimeFigureOut">
               <a:rPr lang="de-DE" smtClean="0"/>
-              <a:t>25.04.19</a:t>
+              <a:t>26.04.19</a:t>
             </a:fld>
             <a:endParaRPr lang="de-DE"/>
           </a:p>
@@ -4192,6 +4404,406 @@
     <p:extLst>
       <p:ext uri="{BB962C8B-B14F-4D97-AF65-F5344CB8AC3E}">
         <p14:creationId xmlns:p14="http://schemas.microsoft.com/office/powerpoint/2010/main" val="1915762099"/>
+      </p:ext>
+    </p:extLst>
+  </p:cSld>
+  <p:clrMapOvr>
+    <a:masterClrMapping/>
+  </p:clrMapOvr>
+</p:sld>
+</file>
+
+<file path=ppt/slides/slide2.xml><?xml version="1.0" encoding="utf-8"?>
+<p:sld xmlns:a="http://schemas.openxmlformats.org/drawingml/2006/main" xmlns:r="http://schemas.openxmlformats.org/officeDocument/2006/relationships" xmlns:p="http://schemas.openxmlformats.org/presentationml/2006/main">
+  <p:cSld>
+    <p:spTree>
+      <p:nvGrpSpPr>
+        <p:cNvPr id="1" name=""/>
+        <p:cNvGrpSpPr/>
+        <p:nvPr/>
+      </p:nvGrpSpPr>
+      <p:grpSpPr>
+        <a:xfrm>
+          <a:off x="0" y="0"/>
+          <a:ext cx="0" cy="0"/>
+          <a:chOff x="0" y="0"/>
+          <a:chExt cx="0" cy="0"/>
+        </a:xfrm>
+      </p:grpSpPr>
+      <p:sp>
+        <p:nvSpPr>
+          <p:cNvPr id="10" name="Rectangle 9">
+            <a:extLst>
+              <a:ext uri="{FF2B5EF4-FFF2-40B4-BE49-F238E27FC236}">
+                <a16:creationId xmlns:a16="http://schemas.microsoft.com/office/drawing/2014/main" id="{FA5841D3-5EFF-4B47-A36C-D6A69F171A29}"/>
+              </a:ext>
+            </a:extLst>
+          </p:cNvPr>
+          <p:cNvSpPr/>
+          <p:nvPr/>
+        </p:nvSpPr>
+        <p:spPr>
+          <a:xfrm>
+            <a:off x="4656000" y="2980706"/>
+            <a:ext cx="2880000" cy="3328292"/>
+          </a:xfrm>
+          <a:prstGeom prst="rect">
+            <a:avLst/>
+          </a:prstGeom>
+          <a:solidFill>
+            <a:schemeClr val="accent4"/>
+          </a:solidFill>
+          <a:ln>
+            <a:noFill/>
+          </a:ln>
+        </p:spPr>
+        <p:style>
+          <a:lnRef idx="0">
+            <a:scrgbClr r="0" g="0" b="0"/>
+          </a:lnRef>
+          <a:fillRef idx="0">
+            <a:scrgbClr r="0" g="0" b="0"/>
+          </a:fillRef>
+          <a:effectRef idx="0">
+            <a:scrgbClr r="0" g="0" b="0"/>
+          </a:effectRef>
+          <a:fontRef idx="minor">
+            <a:schemeClr val="lt1"/>
+          </a:fontRef>
+        </p:style>
+        <p:txBody>
+          <a:bodyPr rtlCol="0" anchor="ctr"/>
+          <a:lstStyle/>
+          <a:p>
+            <a:pPr algn="ctr"/>
+            <a:endParaRPr lang="de-DE">
+              <a:solidFill>
+                <a:srgbClr val="FF0000"/>
+              </a:solidFill>
+            </a:endParaRPr>
+          </a:p>
+        </p:txBody>
+      </p:sp>
+      <p:sp>
+        <p:nvSpPr>
+          <p:cNvPr id="2" name="Rounded Rectangle 1">
+            <a:extLst>
+              <a:ext uri="{FF2B5EF4-FFF2-40B4-BE49-F238E27FC236}">
+                <a16:creationId xmlns:a16="http://schemas.microsoft.com/office/drawing/2014/main" id="{1FAD5B4B-F21B-EB42-AC90-B8C3305AF1D3}"/>
+              </a:ext>
+            </a:extLst>
+          </p:cNvPr>
+          <p:cNvSpPr/>
+          <p:nvPr/>
+        </p:nvSpPr>
+        <p:spPr>
+          <a:xfrm>
+            <a:off x="4656000" y="5513350"/>
+            <a:ext cx="2880000" cy="961902"/>
+          </a:xfrm>
+          <a:prstGeom prst="roundRect">
+            <a:avLst/>
+          </a:prstGeom>
+          <a:solidFill>
+            <a:schemeClr val="accent4"/>
+          </a:solidFill>
+          <a:ln>
+            <a:noFill/>
+          </a:ln>
+        </p:spPr>
+        <p:style>
+          <a:lnRef idx="2">
+            <a:schemeClr val="accent1">
+              <a:shade val="50000"/>
+            </a:schemeClr>
+          </a:lnRef>
+          <a:fillRef idx="1">
+            <a:schemeClr val="accent1"/>
+          </a:fillRef>
+          <a:effectRef idx="0">
+            <a:schemeClr val="accent1"/>
+          </a:effectRef>
+          <a:fontRef idx="minor">
+            <a:schemeClr val="lt1"/>
+          </a:fontRef>
+        </p:style>
+        <p:txBody>
+          <a:bodyPr rtlCol="0" anchor="ctr"/>
+          <a:lstStyle/>
+          <a:p>
+            <a:pPr algn="ctr"/>
+            <a:endParaRPr lang="de-DE"/>
+          </a:p>
+        </p:txBody>
+      </p:sp>
+      <p:sp>
+        <p:nvSpPr>
+          <p:cNvPr id="3" name="Trapezoid 2">
+            <a:extLst>
+              <a:ext uri="{FF2B5EF4-FFF2-40B4-BE49-F238E27FC236}">
+                <a16:creationId xmlns:a16="http://schemas.microsoft.com/office/drawing/2014/main" id="{4E6DD535-A575-C942-8F5F-DA163658621A}"/>
+              </a:ext>
+            </a:extLst>
+          </p:cNvPr>
+          <p:cNvSpPr/>
+          <p:nvPr/>
+        </p:nvSpPr>
+        <p:spPr>
+          <a:xfrm>
+            <a:off x="4116000" y="2710706"/>
+            <a:ext cx="3960000" cy="540000"/>
+          </a:xfrm>
+          <a:prstGeom prst="trapezoid">
+            <a:avLst/>
+          </a:prstGeom>
+          <a:solidFill>
+            <a:schemeClr val="accent4"/>
+          </a:solidFill>
+          <a:ln>
+            <a:noFill/>
+          </a:ln>
+        </p:spPr>
+        <p:style>
+          <a:lnRef idx="2">
+            <a:schemeClr val="accent1">
+              <a:shade val="50000"/>
+            </a:schemeClr>
+          </a:lnRef>
+          <a:fillRef idx="1">
+            <a:schemeClr val="accent1"/>
+          </a:fillRef>
+          <a:effectRef idx="0">
+            <a:schemeClr val="accent1"/>
+          </a:effectRef>
+          <a:fontRef idx="minor">
+            <a:schemeClr val="lt1"/>
+          </a:fontRef>
+        </p:style>
+        <p:txBody>
+          <a:bodyPr rtlCol="0" anchor="ctr"/>
+          <a:lstStyle/>
+          <a:p>
+            <a:pPr algn="ctr"/>
+            <a:endParaRPr lang="de-DE"/>
+          </a:p>
+        </p:txBody>
+      </p:sp>
+      <p:sp>
+        <p:nvSpPr>
+          <p:cNvPr id="11" name="Block Arc 10">
+            <a:extLst>
+              <a:ext uri="{FF2B5EF4-FFF2-40B4-BE49-F238E27FC236}">
+                <a16:creationId xmlns:a16="http://schemas.microsoft.com/office/drawing/2014/main" id="{97379651-F90D-814A-8B4D-AC2203D7512C}"/>
+              </a:ext>
+            </a:extLst>
+          </p:cNvPr>
+          <p:cNvSpPr/>
+          <p:nvPr/>
+        </p:nvSpPr>
+        <p:spPr>
+          <a:xfrm>
+            <a:off x="4987635" y="1937244"/>
+            <a:ext cx="2216728" cy="1546924"/>
+          </a:xfrm>
+          <a:prstGeom prst="blockArc">
+            <a:avLst/>
+          </a:prstGeom>
+          <a:solidFill>
+            <a:schemeClr val="accent4"/>
+          </a:solidFill>
+          <a:ln>
+            <a:noFill/>
+          </a:ln>
+        </p:spPr>
+        <p:style>
+          <a:lnRef idx="2">
+            <a:schemeClr val="accent1">
+              <a:shade val="50000"/>
+            </a:schemeClr>
+          </a:lnRef>
+          <a:fillRef idx="1">
+            <a:schemeClr val="accent1"/>
+          </a:fillRef>
+          <a:effectRef idx="0">
+            <a:schemeClr val="accent1"/>
+          </a:effectRef>
+          <a:fontRef idx="minor">
+            <a:schemeClr val="lt1"/>
+          </a:fontRef>
+        </p:style>
+        <p:txBody>
+          <a:bodyPr rtlCol="0" anchor="ctr"/>
+          <a:lstStyle/>
+          <a:p>
+            <a:pPr algn="ctr"/>
+            <a:endParaRPr lang="de-DE">
+              <a:solidFill>
+                <a:schemeClr val="tx1"/>
+              </a:solidFill>
+            </a:endParaRPr>
+          </a:p>
+        </p:txBody>
+      </p:sp>
+      <p:sp>
+        <p:nvSpPr>
+          <p:cNvPr id="12" name="Rounded Rectangle 11">
+            <a:extLst>
+              <a:ext uri="{FF2B5EF4-FFF2-40B4-BE49-F238E27FC236}">
+                <a16:creationId xmlns:a16="http://schemas.microsoft.com/office/drawing/2014/main" id="{FC8E20E0-3F36-A046-91A7-40475933F1FA}"/>
+              </a:ext>
+            </a:extLst>
+          </p:cNvPr>
+          <p:cNvSpPr/>
+          <p:nvPr/>
+        </p:nvSpPr>
+        <p:spPr>
+          <a:xfrm>
+            <a:off x="5076147" y="3429000"/>
+            <a:ext cx="399804" cy="2769919"/>
+          </a:xfrm>
+          <a:prstGeom prst="roundRect">
+            <a:avLst/>
+          </a:prstGeom>
+          <a:solidFill>
+            <a:schemeClr val="bg1"/>
+          </a:solidFill>
+          <a:ln>
+            <a:noFill/>
+          </a:ln>
+        </p:spPr>
+        <p:style>
+          <a:lnRef idx="2">
+            <a:schemeClr val="accent1">
+              <a:shade val="50000"/>
+            </a:schemeClr>
+          </a:lnRef>
+          <a:fillRef idx="1">
+            <a:schemeClr val="accent1"/>
+          </a:fillRef>
+          <a:effectRef idx="0">
+            <a:schemeClr val="accent1"/>
+          </a:effectRef>
+          <a:fontRef idx="minor">
+            <a:schemeClr val="lt1"/>
+          </a:fontRef>
+        </p:style>
+        <p:txBody>
+          <a:bodyPr rtlCol="0" anchor="ctr"/>
+          <a:lstStyle/>
+          <a:p>
+            <a:pPr algn="ctr"/>
+            <a:endParaRPr lang="de-DE"/>
+          </a:p>
+        </p:txBody>
+      </p:sp>
+      <p:sp>
+        <p:nvSpPr>
+          <p:cNvPr id="13" name="Rounded Rectangle 12">
+            <a:extLst>
+              <a:ext uri="{FF2B5EF4-FFF2-40B4-BE49-F238E27FC236}">
+                <a16:creationId xmlns:a16="http://schemas.microsoft.com/office/drawing/2014/main" id="{0AE5FB26-F8C6-604B-A3B1-541D0B3A3A5D}"/>
+              </a:ext>
+            </a:extLst>
+          </p:cNvPr>
+          <p:cNvSpPr/>
+          <p:nvPr/>
+        </p:nvSpPr>
+        <p:spPr>
+          <a:xfrm>
+            <a:off x="5896097" y="3429000"/>
+            <a:ext cx="399804" cy="2769919"/>
+          </a:xfrm>
+          <a:prstGeom prst="roundRect">
+            <a:avLst/>
+          </a:prstGeom>
+          <a:solidFill>
+            <a:schemeClr val="bg1"/>
+          </a:solidFill>
+          <a:ln>
+            <a:noFill/>
+          </a:ln>
+        </p:spPr>
+        <p:style>
+          <a:lnRef idx="2">
+            <a:schemeClr val="accent1">
+              <a:shade val="50000"/>
+            </a:schemeClr>
+          </a:lnRef>
+          <a:fillRef idx="1">
+            <a:schemeClr val="accent1"/>
+          </a:fillRef>
+          <a:effectRef idx="0">
+            <a:schemeClr val="accent1"/>
+          </a:effectRef>
+          <a:fontRef idx="minor">
+            <a:schemeClr val="lt1"/>
+          </a:fontRef>
+        </p:style>
+        <p:txBody>
+          <a:bodyPr rtlCol="0" anchor="ctr"/>
+          <a:lstStyle/>
+          <a:p>
+            <a:pPr algn="ctr"/>
+            <a:endParaRPr lang="de-DE"/>
+          </a:p>
+        </p:txBody>
+      </p:sp>
+      <p:sp>
+        <p:nvSpPr>
+          <p:cNvPr id="14" name="Rounded Rectangle 13">
+            <a:extLst>
+              <a:ext uri="{FF2B5EF4-FFF2-40B4-BE49-F238E27FC236}">
+                <a16:creationId xmlns:a16="http://schemas.microsoft.com/office/drawing/2014/main" id="{C1CACCC5-DB86-164D-AD1F-254C17414CEE}"/>
+              </a:ext>
+            </a:extLst>
+          </p:cNvPr>
+          <p:cNvSpPr/>
+          <p:nvPr/>
+        </p:nvSpPr>
+        <p:spPr>
+          <a:xfrm>
+            <a:off x="6736553" y="3429000"/>
+            <a:ext cx="356974" cy="2769919"/>
+          </a:xfrm>
+          <a:prstGeom prst="roundRect">
+            <a:avLst/>
+          </a:prstGeom>
+          <a:solidFill>
+            <a:schemeClr val="bg1"/>
+          </a:solidFill>
+          <a:ln>
+            <a:noFill/>
+          </a:ln>
+        </p:spPr>
+        <p:style>
+          <a:lnRef idx="2">
+            <a:schemeClr val="accent1">
+              <a:shade val="50000"/>
+            </a:schemeClr>
+          </a:lnRef>
+          <a:fillRef idx="1">
+            <a:schemeClr val="accent1"/>
+          </a:fillRef>
+          <a:effectRef idx="0">
+            <a:schemeClr val="accent1"/>
+          </a:effectRef>
+          <a:fontRef idx="minor">
+            <a:schemeClr val="lt1"/>
+          </a:fontRef>
+        </p:style>
+        <p:txBody>
+          <a:bodyPr rtlCol="0" anchor="ctr"/>
+          <a:lstStyle/>
+          <a:p>
+            <a:pPr algn="ctr"/>
+            <a:endParaRPr lang="de-DE"/>
+          </a:p>
+        </p:txBody>
+      </p:sp>
+    </p:spTree>
+    <p:extLst>
+      <p:ext uri="{BB962C8B-B14F-4D97-AF65-F5344CB8AC3E}">
+        <p14:creationId xmlns:p14="http://schemas.microsoft.com/office/powerpoint/2010/main" val="3549659542"/>
       </p:ext>
     </p:extLst>
   </p:cSld>

</xml_diff>

<commit_message>
Added splash screen to app. Cleaned up cordova folder. Cleaned up config.xml. Moved local APK build script to new folder. Update README.md.
</commit_message>
<xml_diff>
--- a/src/statics/logo_three_post_its/logo_three_post_its.pptx
+++ b/src/statics/logo_three_post_its/logo_three_post_its.pptx
@@ -5,11 +5,10 @@
     <p:sldMasterId id="2147483648" r:id="rId1"/>
   </p:sldMasterIdLst>
   <p:notesMasterIdLst>
-    <p:notesMasterId r:id="rId4"/>
+    <p:notesMasterId r:id="rId3"/>
   </p:notesMasterIdLst>
   <p:sldIdLst>
     <p:sldId id="256" r:id="rId2"/>
-    <p:sldId id="257" r:id="rId3"/>
   </p:sldIdLst>
   <p:sldSz cx="12192000" cy="6858000"/>
   <p:notesSz cx="6858000" cy="9144000"/>
@@ -198,7 +197,7 @@
           <a:p>
             <a:fld id="{AFE0028A-F952-0746-A39E-5155B39678B7}" type="datetimeFigureOut">
               <a:rPr lang="de-DE" smtClean="0"/>
-              <a:t>26.04.19</a:t>
+              <a:t>05.07.20</a:t>
             </a:fld>
             <a:endParaRPr lang="de-DE"/>
           </a:p>
@@ -677,217 +676,6 @@
 </p:notes>
 </file>
 
-<file path=ppt/notesSlides/notesSlide2.xml><?xml version="1.0" encoding="utf-8"?>
-<p:notes xmlns:a="http://schemas.openxmlformats.org/drawingml/2006/main" xmlns:r="http://schemas.openxmlformats.org/officeDocument/2006/relationships" xmlns:p="http://schemas.openxmlformats.org/presentationml/2006/main">
-  <p:cSld>
-    <p:spTree>
-      <p:nvGrpSpPr>
-        <p:cNvPr id="1" name=""/>
-        <p:cNvGrpSpPr/>
-        <p:nvPr/>
-      </p:nvGrpSpPr>
-      <p:grpSpPr>
-        <a:xfrm>
-          <a:off x="0" y="0"/>
-          <a:ext cx="0" cy="0"/>
-          <a:chOff x="0" y="0"/>
-          <a:chExt cx="0" cy="0"/>
-        </a:xfrm>
-      </p:grpSpPr>
-      <p:sp>
-        <p:nvSpPr>
-          <p:cNvPr id="2" name="Slide Image Placeholder 1"/>
-          <p:cNvSpPr>
-            <a:spLocks noGrp="1" noRot="1" noChangeAspect="1"/>
-          </p:cNvSpPr>
-          <p:nvPr>
-            <p:ph type="sldImg"/>
-          </p:nvPr>
-        </p:nvSpPr>
-        <p:spPr/>
-      </p:sp>
-      <p:sp>
-        <p:nvSpPr>
-          <p:cNvPr id="3" name="Notes Placeholder 2"/>
-          <p:cNvSpPr>
-            <a:spLocks noGrp="1"/>
-          </p:cNvSpPr>
-          <p:nvPr>
-            <p:ph type="body" idx="1"/>
-          </p:nvPr>
-        </p:nvSpPr>
-        <p:spPr/>
-        <p:txBody>
-          <a:bodyPr/>
-          <a:lstStyle/>
-          <a:p>
-            <a:r>
-              <a:rPr lang="de-DE" dirty="0"/>
-              <a:t>Colors:</a:t>
-            </a:r>
-          </a:p>
-          <a:p>
-            <a:r>
-              <a:rPr lang="de-DE" dirty="0"/>
-              <a:t>Light Yellow: </a:t>
-            </a:r>
-          </a:p>
-          <a:p>
-            <a:r>
-              <a:rPr lang="de-DE" dirty="0"/>
-              <a:t>RGB: 254, 217, 102</a:t>
-            </a:r>
-          </a:p>
-          <a:p>
-            <a:pPr marL="0" marR="0" lvl="0" indent="0" algn="l" defTabSz="914400" rtl="0" eaLnBrk="1" fontAlgn="auto" latinLnBrk="0" hangingPunct="1">
-              <a:lnSpc>
-                <a:spcPct val="100000"/>
-              </a:lnSpc>
-              <a:spcBef>
-                <a:spcPts val="0"/>
-              </a:spcBef>
-              <a:spcAft>
-                <a:spcPts val="0"/>
-              </a:spcAft>
-              <a:buClrTx/>
-              <a:buSzTx/>
-              <a:buFontTx/>
-              <a:buNone/>
-              <a:tabLst/>
-              <a:defRPr/>
-            </a:pPr>
-            <a:r>
-              <a:rPr lang="de-DE" sz="1200" b="1" i="0" kern="1200" dirty="0">
-                <a:solidFill>
-                  <a:schemeClr val="tx1"/>
-                </a:solidFill>
-                <a:effectLst/>
-                <a:latin typeface="+mn-lt"/>
-                <a:ea typeface="+mn-ea"/>
-                <a:cs typeface="+mn-cs"/>
-              </a:rPr>
-              <a:t>#FED966</a:t>
-            </a:r>
-            <a:endParaRPr lang="de-DE" dirty="0"/>
-          </a:p>
-          <a:p>
-            <a:endParaRPr lang="de-DE" dirty="0"/>
-          </a:p>
-          <a:p>
-            <a:r>
-              <a:rPr lang="de-DE" dirty="0" err="1"/>
-              <a:t>Darker</a:t>
-            </a:r>
-            <a:r>
-              <a:rPr lang="de-DE" dirty="0"/>
-              <a:t> Yellow:</a:t>
-            </a:r>
-          </a:p>
-          <a:p>
-            <a:r>
-              <a:rPr lang="de-DE" dirty="0"/>
-              <a:t>RGB:  254, 192, 0</a:t>
-            </a:r>
-          </a:p>
-          <a:p>
-            <a:r>
-              <a:rPr lang="de-DE" sz="1200" b="1" i="0" kern="1200" dirty="0">
-                <a:solidFill>
-                  <a:schemeClr val="tx1"/>
-                </a:solidFill>
-                <a:effectLst/>
-                <a:latin typeface="+mn-lt"/>
-                <a:ea typeface="+mn-ea"/>
-                <a:cs typeface="+mn-cs"/>
-              </a:rPr>
-              <a:t>#FEC000</a:t>
-            </a:r>
-            <a:endParaRPr lang="de-DE" dirty="0"/>
-          </a:p>
-          <a:p>
-            <a:endParaRPr lang="de-DE" dirty="0"/>
-          </a:p>
-          <a:p>
-            <a:r>
-              <a:rPr lang="de-DE" dirty="0"/>
-              <a:t>Orange:</a:t>
-            </a:r>
-          </a:p>
-          <a:p>
-            <a:r>
-              <a:rPr lang="de-DE" dirty="0"/>
-              <a:t>RGB: 237, 125, 49</a:t>
-            </a:r>
-          </a:p>
-          <a:p>
-            <a:pPr marL="0" marR="0" lvl="0" indent="0" algn="l" defTabSz="914400" rtl="0" eaLnBrk="1" fontAlgn="auto" latinLnBrk="0" hangingPunct="1">
-              <a:lnSpc>
-                <a:spcPct val="100000"/>
-              </a:lnSpc>
-              <a:spcBef>
-                <a:spcPts val="0"/>
-              </a:spcBef>
-              <a:spcAft>
-                <a:spcPts val="0"/>
-              </a:spcAft>
-              <a:buClrTx/>
-              <a:buSzTx/>
-              <a:buFontTx/>
-              <a:buNone/>
-              <a:tabLst/>
-              <a:defRPr/>
-            </a:pPr>
-            <a:r>
-              <a:rPr lang="de-DE" sz="1200" b="1" i="0" kern="1200">
-                <a:solidFill>
-                  <a:schemeClr val="tx1"/>
-                </a:solidFill>
-                <a:effectLst/>
-                <a:latin typeface="+mn-lt"/>
-                <a:ea typeface="+mn-ea"/>
-                <a:cs typeface="+mn-cs"/>
-              </a:rPr>
-              <a:t>#ED7D31</a:t>
-            </a:r>
-          </a:p>
-        </p:txBody>
-      </p:sp>
-      <p:sp>
-        <p:nvSpPr>
-          <p:cNvPr id="4" name="Slide Number Placeholder 3"/>
-          <p:cNvSpPr>
-            <a:spLocks noGrp="1"/>
-          </p:cNvSpPr>
-          <p:nvPr>
-            <p:ph type="sldNum" sz="quarter" idx="5"/>
-          </p:nvPr>
-        </p:nvSpPr>
-        <p:spPr/>
-        <p:txBody>
-          <a:bodyPr/>
-          <a:lstStyle/>
-          <a:p>
-            <a:fld id="{24786A14-5CC9-1444-825E-73F7627F472C}" type="slidenum">
-              <a:rPr lang="de-DE" smtClean="0"/>
-              <a:t>2</a:t>
-            </a:fld>
-            <a:endParaRPr lang="de-DE"/>
-          </a:p>
-        </p:txBody>
-      </p:sp>
-    </p:spTree>
-    <p:extLst>
-      <p:ext uri="{BB962C8B-B14F-4D97-AF65-F5344CB8AC3E}">
-        <p14:creationId xmlns:p14="http://schemas.microsoft.com/office/powerpoint/2010/main" val="3347806509"/>
-      </p:ext>
-    </p:extLst>
-  </p:cSld>
-  <p:clrMapOvr>
-    <a:masterClrMapping/>
-  </p:clrMapOvr>
-</p:notes>
-</file>
-
 <file path=ppt/slideLayouts/slideLayout1.xml><?xml version="1.0" encoding="utf-8"?>
 <p:sldLayout xmlns:a="http://schemas.openxmlformats.org/drawingml/2006/main" xmlns:r="http://schemas.openxmlformats.org/officeDocument/2006/relationships" xmlns:p="http://schemas.openxmlformats.org/presentationml/2006/main" type="title" preserve="1">
   <p:cSld name="Title Slide">
@@ -1037,7 +825,7 @@
           <a:p>
             <a:fld id="{51832511-F33A-8E4F-A425-D29CC13046B8}" type="datetimeFigureOut">
               <a:rPr lang="de-DE" smtClean="0"/>
-              <a:t>26.04.19</a:t>
+              <a:t>05.07.20</a:t>
             </a:fld>
             <a:endParaRPr lang="de-DE"/>
           </a:p>
@@ -1237,7 +1025,7 @@
           <a:p>
             <a:fld id="{51832511-F33A-8E4F-A425-D29CC13046B8}" type="datetimeFigureOut">
               <a:rPr lang="de-DE" smtClean="0"/>
-              <a:t>26.04.19</a:t>
+              <a:t>05.07.20</a:t>
             </a:fld>
             <a:endParaRPr lang="de-DE"/>
           </a:p>
@@ -1447,7 +1235,7 @@
           <a:p>
             <a:fld id="{51832511-F33A-8E4F-A425-D29CC13046B8}" type="datetimeFigureOut">
               <a:rPr lang="de-DE" smtClean="0"/>
-              <a:t>26.04.19</a:t>
+              <a:t>05.07.20</a:t>
             </a:fld>
             <a:endParaRPr lang="de-DE"/>
           </a:p>
@@ -1647,7 +1435,7 @@
           <a:p>
             <a:fld id="{51832511-F33A-8E4F-A425-D29CC13046B8}" type="datetimeFigureOut">
               <a:rPr lang="de-DE" smtClean="0"/>
-              <a:t>26.04.19</a:t>
+              <a:t>05.07.20</a:t>
             </a:fld>
             <a:endParaRPr lang="de-DE"/>
           </a:p>
@@ -1923,7 +1711,7 @@
           <a:p>
             <a:fld id="{51832511-F33A-8E4F-A425-D29CC13046B8}" type="datetimeFigureOut">
               <a:rPr lang="de-DE" smtClean="0"/>
-              <a:t>26.04.19</a:t>
+              <a:t>05.07.20</a:t>
             </a:fld>
             <a:endParaRPr lang="de-DE"/>
           </a:p>
@@ -2191,7 +1979,7 @@
           <a:p>
             <a:fld id="{51832511-F33A-8E4F-A425-D29CC13046B8}" type="datetimeFigureOut">
               <a:rPr lang="de-DE" smtClean="0"/>
-              <a:t>26.04.19</a:t>
+              <a:t>05.07.20</a:t>
             </a:fld>
             <a:endParaRPr lang="de-DE"/>
           </a:p>
@@ -2606,7 +2394,7 @@
           <a:p>
             <a:fld id="{51832511-F33A-8E4F-A425-D29CC13046B8}" type="datetimeFigureOut">
               <a:rPr lang="de-DE" smtClean="0"/>
-              <a:t>26.04.19</a:t>
+              <a:t>05.07.20</a:t>
             </a:fld>
             <a:endParaRPr lang="de-DE"/>
           </a:p>
@@ -2748,7 +2536,7 @@
           <a:p>
             <a:fld id="{51832511-F33A-8E4F-A425-D29CC13046B8}" type="datetimeFigureOut">
               <a:rPr lang="de-DE" smtClean="0"/>
-              <a:t>26.04.19</a:t>
+              <a:t>05.07.20</a:t>
             </a:fld>
             <a:endParaRPr lang="de-DE"/>
           </a:p>
@@ -2861,7 +2649,7 @@
           <a:p>
             <a:fld id="{51832511-F33A-8E4F-A425-D29CC13046B8}" type="datetimeFigureOut">
               <a:rPr lang="de-DE" smtClean="0"/>
-              <a:t>26.04.19</a:t>
+              <a:t>05.07.20</a:t>
             </a:fld>
             <a:endParaRPr lang="de-DE"/>
           </a:p>
@@ -3174,7 +2962,7 @@
           <a:p>
             <a:fld id="{51832511-F33A-8E4F-A425-D29CC13046B8}" type="datetimeFigureOut">
               <a:rPr lang="de-DE" smtClean="0"/>
-              <a:t>26.04.19</a:t>
+              <a:t>05.07.20</a:t>
             </a:fld>
             <a:endParaRPr lang="de-DE"/>
           </a:p>
@@ -3463,7 +3251,7 @@
           <a:p>
             <a:fld id="{51832511-F33A-8E4F-A425-D29CC13046B8}" type="datetimeFigureOut">
               <a:rPr lang="de-DE" smtClean="0"/>
-              <a:t>26.04.19</a:t>
+              <a:t>05.07.20</a:t>
             </a:fld>
             <a:endParaRPr lang="de-DE"/>
           </a:p>
@@ -3706,7 +3494,7 @@
           <a:p>
             <a:fld id="{51832511-F33A-8E4F-A425-D29CC13046B8}" type="datetimeFigureOut">
               <a:rPr lang="de-DE" smtClean="0"/>
-              <a:t>26.04.19</a:t>
+              <a:t>05.07.20</a:t>
             </a:fld>
             <a:endParaRPr lang="de-DE"/>
           </a:p>
@@ -4109,6 +3897,14 @@
 <file path=ppt/slides/slide1.xml><?xml version="1.0" encoding="utf-8"?>
 <p:sld xmlns:a="http://schemas.openxmlformats.org/drawingml/2006/main" xmlns:r="http://schemas.openxmlformats.org/officeDocument/2006/relationships" xmlns:p="http://schemas.openxmlformats.org/presentationml/2006/main">
   <p:cSld>
+    <p:bg>
+      <p:bgPr>
+        <a:solidFill>
+          <a:srgbClr val="F5F5F5"/>
+        </a:solidFill>
+        <a:effectLst/>
+      </p:bgPr>
+    </p:bg>
     <p:spTree>
       <p:nvGrpSpPr>
         <p:cNvPr id="1" name=""/>
@@ -4404,406 +4200,6 @@
     <p:extLst>
       <p:ext uri="{BB962C8B-B14F-4D97-AF65-F5344CB8AC3E}">
         <p14:creationId xmlns:p14="http://schemas.microsoft.com/office/powerpoint/2010/main" val="1915762099"/>
-      </p:ext>
-    </p:extLst>
-  </p:cSld>
-  <p:clrMapOvr>
-    <a:masterClrMapping/>
-  </p:clrMapOvr>
-</p:sld>
-</file>
-
-<file path=ppt/slides/slide2.xml><?xml version="1.0" encoding="utf-8"?>
-<p:sld xmlns:a="http://schemas.openxmlformats.org/drawingml/2006/main" xmlns:r="http://schemas.openxmlformats.org/officeDocument/2006/relationships" xmlns:p="http://schemas.openxmlformats.org/presentationml/2006/main">
-  <p:cSld>
-    <p:spTree>
-      <p:nvGrpSpPr>
-        <p:cNvPr id="1" name=""/>
-        <p:cNvGrpSpPr/>
-        <p:nvPr/>
-      </p:nvGrpSpPr>
-      <p:grpSpPr>
-        <a:xfrm>
-          <a:off x="0" y="0"/>
-          <a:ext cx="0" cy="0"/>
-          <a:chOff x="0" y="0"/>
-          <a:chExt cx="0" cy="0"/>
-        </a:xfrm>
-      </p:grpSpPr>
-      <p:sp>
-        <p:nvSpPr>
-          <p:cNvPr id="10" name="Rectangle 9">
-            <a:extLst>
-              <a:ext uri="{FF2B5EF4-FFF2-40B4-BE49-F238E27FC236}">
-                <a16:creationId xmlns:a16="http://schemas.microsoft.com/office/drawing/2014/main" id="{FA5841D3-5EFF-4B47-A36C-D6A69F171A29}"/>
-              </a:ext>
-            </a:extLst>
-          </p:cNvPr>
-          <p:cNvSpPr/>
-          <p:nvPr/>
-        </p:nvSpPr>
-        <p:spPr>
-          <a:xfrm>
-            <a:off x="4656000" y="2980706"/>
-            <a:ext cx="2880000" cy="3328292"/>
-          </a:xfrm>
-          <a:prstGeom prst="rect">
-            <a:avLst/>
-          </a:prstGeom>
-          <a:solidFill>
-            <a:schemeClr val="accent4"/>
-          </a:solidFill>
-          <a:ln>
-            <a:noFill/>
-          </a:ln>
-        </p:spPr>
-        <p:style>
-          <a:lnRef idx="0">
-            <a:scrgbClr r="0" g="0" b="0"/>
-          </a:lnRef>
-          <a:fillRef idx="0">
-            <a:scrgbClr r="0" g="0" b="0"/>
-          </a:fillRef>
-          <a:effectRef idx="0">
-            <a:scrgbClr r="0" g="0" b="0"/>
-          </a:effectRef>
-          <a:fontRef idx="minor">
-            <a:schemeClr val="lt1"/>
-          </a:fontRef>
-        </p:style>
-        <p:txBody>
-          <a:bodyPr rtlCol="0" anchor="ctr"/>
-          <a:lstStyle/>
-          <a:p>
-            <a:pPr algn="ctr"/>
-            <a:endParaRPr lang="de-DE">
-              <a:solidFill>
-                <a:srgbClr val="FF0000"/>
-              </a:solidFill>
-            </a:endParaRPr>
-          </a:p>
-        </p:txBody>
-      </p:sp>
-      <p:sp>
-        <p:nvSpPr>
-          <p:cNvPr id="2" name="Rounded Rectangle 1">
-            <a:extLst>
-              <a:ext uri="{FF2B5EF4-FFF2-40B4-BE49-F238E27FC236}">
-                <a16:creationId xmlns:a16="http://schemas.microsoft.com/office/drawing/2014/main" id="{1FAD5B4B-F21B-EB42-AC90-B8C3305AF1D3}"/>
-              </a:ext>
-            </a:extLst>
-          </p:cNvPr>
-          <p:cNvSpPr/>
-          <p:nvPr/>
-        </p:nvSpPr>
-        <p:spPr>
-          <a:xfrm>
-            <a:off x="4656000" y="5513350"/>
-            <a:ext cx="2880000" cy="961902"/>
-          </a:xfrm>
-          <a:prstGeom prst="roundRect">
-            <a:avLst/>
-          </a:prstGeom>
-          <a:solidFill>
-            <a:schemeClr val="accent4"/>
-          </a:solidFill>
-          <a:ln>
-            <a:noFill/>
-          </a:ln>
-        </p:spPr>
-        <p:style>
-          <a:lnRef idx="2">
-            <a:schemeClr val="accent1">
-              <a:shade val="50000"/>
-            </a:schemeClr>
-          </a:lnRef>
-          <a:fillRef idx="1">
-            <a:schemeClr val="accent1"/>
-          </a:fillRef>
-          <a:effectRef idx="0">
-            <a:schemeClr val="accent1"/>
-          </a:effectRef>
-          <a:fontRef idx="minor">
-            <a:schemeClr val="lt1"/>
-          </a:fontRef>
-        </p:style>
-        <p:txBody>
-          <a:bodyPr rtlCol="0" anchor="ctr"/>
-          <a:lstStyle/>
-          <a:p>
-            <a:pPr algn="ctr"/>
-            <a:endParaRPr lang="de-DE"/>
-          </a:p>
-        </p:txBody>
-      </p:sp>
-      <p:sp>
-        <p:nvSpPr>
-          <p:cNvPr id="3" name="Trapezoid 2">
-            <a:extLst>
-              <a:ext uri="{FF2B5EF4-FFF2-40B4-BE49-F238E27FC236}">
-                <a16:creationId xmlns:a16="http://schemas.microsoft.com/office/drawing/2014/main" id="{4E6DD535-A575-C942-8F5F-DA163658621A}"/>
-              </a:ext>
-            </a:extLst>
-          </p:cNvPr>
-          <p:cNvSpPr/>
-          <p:nvPr/>
-        </p:nvSpPr>
-        <p:spPr>
-          <a:xfrm>
-            <a:off x="4116000" y="2710706"/>
-            <a:ext cx="3960000" cy="540000"/>
-          </a:xfrm>
-          <a:prstGeom prst="trapezoid">
-            <a:avLst/>
-          </a:prstGeom>
-          <a:solidFill>
-            <a:schemeClr val="accent4"/>
-          </a:solidFill>
-          <a:ln>
-            <a:noFill/>
-          </a:ln>
-        </p:spPr>
-        <p:style>
-          <a:lnRef idx="2">
-            <a:schemeClr val="accent1">
-              <a:shade val="50000"/>
-            </a:schemeClr>
-          </a:lnRef>
-          <a:fillRef idx="1">
-            <a:schemeClr val="accent1"/>
-          </a:fillRef>
-          <a:effectRef idx="0">
-            <a:schemeClr val="accent1"/>
-          </a:effectRef>
-          <a:fontRef idx="minor">
-            <a:schemeClr val="lt1"/>
-          </a:fontRef>
-        </p:style>
-        <p:txBody>
-          <a:bodyPr rtlCol="0" anchor="ctr"/>
-          <a:lstStyle/>
-          <a:p>
-            <a:pPr algn="ctr"/>
-            <a:endParaRPr lang="de-DE"/>
-          </a:p>
-        </p:txBody>
-      </p:sp>
-      <p:sp>
-        <p:nvSpPr>
-          <p:cNvPr id="11" name="Block Arc 10">
-            <a:extLst>
-              <a:ext uri="{FF2B5EF4-FFF2-40B4-BE49-F238E27FC236}">
-                <a16:creationId xmlns:a16="http://schemas.microsoft.com/office/drawing/2014/main" id="{97379651-F90D-814A-8B4D-AC2203D7512C}"/>
-              </a:ext>
-            </a:extLst>
-          </p:cNvPr>
-          <p:cNvSpPr/>
-          <p:nvPr/>
-        </p:nvSpPr>
-        <p:spPr>
-          <a:xfrm>
-            <a:off x="4987635" y="1937244"/>
-            <a:ext cx="2216728" cy="1546924"/>
-          </a:xfrm>
-          <a:prstGeom prst="blockArc">
-            <a:avLst/>
-          </a:prstGeom>
-          <a:solidFill>
-            <a:schemeClr val="accent4"/>
-          </a:solidFill>
-          <a:ln>
-            <a:noFill/>
-          </a:ln>
-        </p:spPr>
-        <p:style>
-          <a:lnRef idx="2">
-            <a:schemeClr val="accent1">
-              <a:shade val="50000"/>
-            </a:schemeClr>
-          </a:lnRef>
-          <a:fillRef idx="1">
-            <a:schemeClr val="accent1"/>
-          </a:fillRef>
-          <a:effectRef idx="0">
-            <a:schemeClr val="accent1"/>
-          </a:effectRef>
-          <a:fontRef idx="minor">
-            <a:schemeClr val="lt1"/>
-          </a:fontRef>
-        </p:style>
-        <p:txBody>
-          <a:bodyPr rtlCol="0" anchor="ctr"/>
-          <a:lstStyle/>
-          <a:p>
-            <a:pPr algn="ctr"/>
-            <a:endParaRPr lang="de-DE">
-              <a:solidFill>
-                <a:schemeClr val="tx1"/>
-              </a:solidFill>
-            </a:endParaRPr>
-          </a:p>
-        </p:txBody>
-      </p:sp>
-      <p:sp>
-        <p:nvSpPr>
-          <p:cNvPr id="12" name="Rounded Rectangle 11">
-            <a:extLst>
-              <a:ext uri="{FF2B5EF4-FFF2-40B4-BE49-F238E27FC236}">
-                <a16:creationId xmlns:a16="http://schemas.microsoft.com/office/drawing/2014/main" id="{FC8E20E0-3F36-A046-91A7-40475933F1FA}"/>
-              </a:ext>
-            </a:extLst>
-          </p:cNvPr>
-          <p:cNvSpPr/>
-          <p:nvPr/>
-        </p:nvSpPr>
-        <p:spPr>
-          <a:xfrm>
-            <a:off x="5076147" y="3429000"/>
-            <a:ext cx="399804" cy="2769919"/>
-          </a:xfrm>
-          <a:prstGeom prst="roundRect">
-            <a:avLst/>
-          </a:prstGeom>
-          <a:solidFill>
-            <a:schemeClr val="bg1"/>
-          </a:solidFill>
-          <a:ln>
-            <a:noFill/>
-          </a:ln>
-        </p:spPr>
-        <p:style>
-          <a:lnRef idx="2">
-            <a:schemeClr val="accent1">
-              <a:shade val="50000"/>
-            </a:schemeClr>
-          </a:lnRef>
-          <a:fillRef idx="1">
-            <a:schemeClr val="accent1"/>
-          </a:fillRef>
-          <a:effectRef idx="0">
-            <a:schemeClr val="accent1"/>
-          </a:effectRef>
-          <a:fontRef idx="minor">
-            <a:schemeClr val="lt1"/>
-          </a:fontRef>
-        </p:style>
-        <p:txBody>
-          <a:bodyPr rtlCol="0" anchor="ctr"/>
-          <a:lstStyle/>
-          <a:p>
-            <a:pPr algn="ctr"/>
-            <a:endParaRPr lang="de-DE"/>
-          </a:p>
-        </p:txBody>
-      </p:sp>
-      <p:sp>
-        <p:nvSpPr>
-          <p:cNvPr id="13" name="Rounded Rectangle 12">
-            <a:extLst>
-              <a:ext uri="{FF2B5EF4-FFF2-40B4-BE49-F238E27FC236}">
-                <a16:creationId xmlns:a16="http://schemas.microsoft.com/office/drawing/2014/main" id="{0AE5FB26-F8C6-604B-A3B1-541D0B3A3A5D}"/>
-              </a:ext>
-            </a:extLst>
-          </p:cNvPr>
-          <p:cNvSpPr/>
-          <p:nvPr/>
-        </p:nvSpPr>
-        <p:spPr>
-          <a:xfrm>
-            <a:off x="5896097" y="3429000"/>
-            <a:ext cx="399804" cy="2769919"/>
-          </a:xfrm>
-          <a:prstGeom prst="roundRect">
-            <a:avLst/>
-          </a:prstGeom>
-          <a:solidFill>
-            <a:schemeClr val="bg1"/>
-          </a:solidFill>
-          <a:ln>
-            <a:noFill/>
-          </a:ln>
-        </p:spPr>
-        <p:style>
-          <a:lnRef idx="2">
-            <a:schemeClr val="accent1">
-              <a:shade val="50000"/>
-            </a:schemeClr>
-          </a:lnRef>
-          <a:fillRef idx="1">
-            <a:schemeClr val="accent1"/>
-          </a:fillRef>
-          <a:effectRef idx="0">
-            <a:schemeClr val="accent1"/>
-          </a:effectRef>
-          <a:fontRef idx="minor">
-            <a:schemeClr val="lt1"/>
-          </a:fontRef>
-        </p:style>
-        <p:txBody>
-          <a:bodyPr rtlCol="0" anchor="ctr"/>
-          <a:lstStyle/>
-          <a:p>
-            <a:pPr algn="ctr"/>
-            <a:endParaRPr lang="de-DE"/>
-          </a:p>
-        </p:txBody>
-      </p:sp>
-      <p:sp>
-        <p:nvSpPr>
-          <p:cNvPr id="14" name="Rounded Rectangle 13">
-            <a:extLst>
-              <a:ext uri="{FF2B5EF4-FFF2-40B4-BE49-F238E27FC236}">
-                <a16:creationId xmlns:a16="http://schemas.microsoft.com/office/drawing/2014/main" id="{C1CACCC5-DB86-164D-AD1F-254C17414CEE}"/>
-              </a:ext>
-            </a:extLst>
-          </p:cNvPr>
-          <p:cNvSpPr/>
-          <p:nvPr/>
-        </p:nvSpPr>
-        <p:spPr>
-          <a:xfrm>
-            <a:off x="6736553" y="3429000"/>
-            <a:ext cx="356974" cy="2769919"/>
-          </a:xfrm>
-          <a:prstGeom prst="roundRect">
-            <a:avLst/>
-          </a:prstGeom>
-          <a:solidFill>
-            <a:schemeClr val="bg1"/>
-          </a:solidFill>
-          <a:ln>
-            <a:noFill/>
-          </a:ln>
-        </p:spPr>
-        <p:style>
-          <a:lnRef idx="2">
-            <a:schemeClr val="accent1">
-              <a:shade val="50000"/>
-            </a:schemeClr>
-          </a:lnRef>
-          <a:fillRef idx="1">
-            <a:schemeClr val="accent1"/>
-          </a:fillRef>
-          <a:effectRef idx="0">
-            <a:schemeClr val="accent1"/>
-          </a:effectRef>
-          <a:fontRef idx="minor">
-            <a:schemeClr val="lt1"/>
-          </a:fontRef>
-        </p:style>
-        <p:txBody>
-          <a:bodyPr rtlCol="0" anchor="ctr"/>
-          <a:lstStyle/>
-          <a:p>
-            <a:pPr algn="ctr"/>
-            <a:endParaRPr lang="de-DE"/>
-          </a:p>
-        </p:txBody>
-      </p:sp>
-    </p:spTree>
-    <p:extLst>
-      <p:ext uri="{BB962C8B-B14F-4D97-AF65-F5344CB8AC3E}">
-        <p14:creationId xmlns:p14="http://schemas.microsoft.com/office/powerpoint/2010/main" val="3549659542"/>
       </p:ext>
     </p:extLst>
   </p:cSld>

</xml_diff>